<commit_message>
added a couple more slides
</commit_message>
<xml_diff>
--- a/docs/Presentation.pptx
+++ b/docs/Presentation.pptx
@@ -5,7 +5,7 @@
     <p:sldMasterId id="2147483648" r:id="rId1"/>
   </p:sldMasterIdLst>
   <p:notesMasterIdLst>
-    <p:notesMasterId r:id="rId12"/>
+    <p:notesMasterId r:id="rId14"/>
   </p:notesMasterIdLst>
   <p:sldIdLst>
     <p:sldId id="256" r:id="rId2"/>
@@ -18,6 +18,8 @@
     <p:sldId id="262" r:id="rId9"/>
     <p:sldId id="263" r:id="rId10"/>
     <p:sldId id="261" r:id="rId11"/>
+    <p:sldId id="266" r:id="rId12"/>
+    <p:sldId id="267" r:id="rId13"/>
   </p:sldIdLst>
   <p:sldSz cx="9144000" cy="6858000" type="screen4x3"/>
   <p:notesSz cx="6858000" cy="9144000"/>
@@ -116,6 +118,22 @@
       </a:defRPr>
     </a:lvl9pPr>
   </p:defaultTextStyle>
+  <p:extLst>
+    <p:ext uri="{EFAFB233-063F-42B5-8137-9DF3F51BA10A}">
+      <p15:sldGuideLst xmlns:p15="http://schemas.microsoft.com/office/powerpoint/2012/main">
+        <p15:guide id="1" orient="horz" pos="2160">
+          <p15:clr>
+            <a:srgbClr val="A4A3A4"/>
+          </p15:clr>
+        </p15:guide>
+        <p15:guide id="2" pos="2880">
+          <p15:clr>
+            <a:srgbClr val="A4A3A4"/>
+          </p15:clr>
+        </p15:guide>
+      </p15:sldGuideLst>
+    </p:ext>
+  </p:extLst>
 </p:presentation>
 </file>
 
@@ -201,7 +219,7 @@
           <a:p>
             <a:fld id="{B4B01C59-D08A-43C2-B163-1F07386BD4FA}" type="datetimeFigureOut">
               <a:rPr lang="en-US" smtClean="0"/>
-              <a:t>5/1/2015</a:t>
+              <a:t>5/3/2015</a:t>
             </a:fld>
             <a:endParaRPr lang="en-US"/>
           </a:p>
@@ -561,6 +579,98 @@
 </p:notes>
 </file>
 
+<file path=ppt/notesSlides/notesSlide10.xml><?xml version="1.0" encoding="utf-8"?>
+<p:notes xmlns:a="http://schemas.openxmlformats.org/drawingml/2006/main" xmlns:r="http://schemas.openxmlformats.org/officeDocument/2006/relationships" xmlns:p="http://schemas.openxmlformats.org/presentationml/2006/main">
+  <p:cSld>
+    <p:spTree>
+      <p:nvGrpSpPr>
+        <p:cNvPr id="1" name=""/>
+        <p:cNvGrpSpPr/>
+        <p:nvPr/>
+      </p:nvGrpSpPr>
+      <p:grpSpPr>
+        <a:xfrm>
+          <a:off x="0" y="0"/>
+          <a:ext cx="0" cy="0"/>
+          <a:chOff x="0" y="0"/>
+          <a:chExt cx="0" cy="0"/>
+        </a:xfrm>
+      </p:grpSpPr>
+      <p:sp>
+        <p:nvSpPr>
+          <p:cNvPr id="2" name="Slide Image Placeholder 1"/>
+          <p:cNvSpPr>
+            <a:spLocks noGrp="1" noRot="1" noChangeAspect="1"/>
+          </p:cNvSpPr>
+          <p:nvPr>
+            <p:ph type="sldImg"/>
+          </p:nvPr>
+        </p:nvSpPr>
+        <p:spPr/>
+      </p:sp>
+      <p:sp>
+        <p:nvSpPr>
+          <p:cNvPr id="3" name="Notes Placeholder 2"/>
+          <p:cNvSpPr>
+            <a:spLocks noGrp="1"/>
+          </p:cNvSpPr>
+          <p:nvPr>
+            <p:ph type="body" idx="1"/>
+          </p:nvPr>
+        </p:nvSpPr>
+        <p:spPr/>
+        <p:txBody>
+          <a:bodyPr/>
+          <a:lstStyle/>
+          <a:p>
+            <a:r>
+              <a:rPr lang="en-US" dirty="0" smtClean="0"/>
+              <a:t>There</a:t>
+            </a:r>
+            <a:r>
+              <a:rPr lang="en-US" baseline="0" dirty="0" smtClean="0"/>
+              <a:t> are many things that would still need to be done for a commercial website</a:t>
+            </a:r>
+            <a:endParaRPr lang="en-US" dirty="0"/>
+          </a:p>
+        </p:txBody>
+      </p:sp>
+      <p:sp>
+        <p:nvSpPr>
+          <p:cNvPr id="4" name="Slide Number Placeholder 3"/>
+          <p:cNvSpPr>
+            <a:spLocks noGrp="1"/>
+          </p:cNvSpPr>
+          <p:nvPr>
+            <p:ph type="sldNum" sz="quarter" idx="10"/>
+          </p:nvPr>
+        </p:nvSpPr>
+        <p:spPr/>
+        <p:txBody>
+          <a:bodyPr/>
+          <a:lstStyle/>
+          <a:p>
+            <a:fld id="{C9A18F79-F81E-4CCA-8818-010600813E75}" type="slidenum">
+              <a:rPr lang="en-US" smtClean="0"/>
+              <a:t>12</a:t>
+            </a:fld>
+            <a:endParaRPr lang="en-US"/>
+          </a:p>
+        </p:txBody>
+      </p:sp>
+    </p:spTree>
+    <p:extLst>
+      <p:ext uri="{BB962C8B-B14F-4D97-AF65-F5344CB8AC3E}">
+        <p14:creationId xmlns:p14="http://schemas.microsoft.com/office/powerpoint/2010/main" val="4000416249"/>
+      </p:ext>
+    </p:extLst>
+  </p:cSld>
+  <p:clrMapOvr>
+    <a:masterClrMapping/>
+  </p:clrMapOvr>
+</p:notes>
+</file>
+
 <file path=ppt/notesSlides/notesSlide2.xml><?xml version="1.0" encoding="utf-8"?>
 <p:notes xmlns:a="http://schemas.openxmlformats.org/drawingml/2006/main" xmlns:r="http://schemas.openxmlformats.org/officeDocument/2006/relationships" xmlns:p="http://schemas.openxmlformats.org/presentationml/2006/main">
   <p:cSld>
@@ -791,7 +901,15 @@
           <a:p>
             <a:r>
               <a:rPr lang="en-US" dirty="0" smtClean="0"/>
-              <a:t>List some advantages of the Website solution</a:t>
+              <a:t>List some advantages of the Website </a:t>
+            </a:r>
+            <a:r>
+              <a:rPr lang="en-US" dirty="0" smtClean="0"/>
+              <a:t>solution.  Also point out that this Website design could be adapted for anything</a:t>
+            </a:r>
+            <a:r>
+              <a:rPr lang="en-US" baseline="0" dirty="0" smtClean="0"/>
+              <a:t> else needing a list -  home repair projects , grocery shopping list.</a:t>
             </a:r>
             <a:endParaRPr lang="en-US" dirty="0"/>
           </a:p>
@@ -887,7 +1005,11 @@
             </a:r>
             <a:r>
               <a:rPr lang="en-US" dirty="0" smtClean="0"/>
-              <a:t>HAPPY   PATH  Use Case  flow chart    - page 1  In this</a:t>
+              <a:t>HAPPY </a:t>
+            </a:r>
+            <a:r>
+              <a:rPr lang="en-US" dirty="0" smtClean="0"/>
+              <a:t>PATH  Use Case  flow chart    - page 1  In this</a:t>
             </a:r>
             <a:r>
               <a:rPr lang="en-US" baseline="0" dirty="0" smtClean="0"/>
@@ -1095,11 +1217,7 @@
             </a:r>
             <a:r>
               <a:rPr lang="en-US" baseline="0" dirty="0" smtClean="0"/>
-              <a:t> the end of the demo, we could ask them all to enter a new row, and put 1 positive statements </a:t>
-            </a:r>
-            <a:r>
-              <a:rPr lang="en-US" baseline="0" dirty="0" smtClean="0"/>
-              <a:t>in the morning activities box , 1 negative statements in the afternoon activities box, and 1 suggestion in the afternoon activities box.  Then SAVE.  This will give us some UI design feedback.</a:t>
+              <a:t> the end of the demo, we could ask them all to enter a new row, and put 1 positive statements in the morning activities box , 1 negative statements in the afternoon activities box, and 1 suggestion in the afternoon activities box.  Then SAVE.  This will give us some UI design feedback.</a:t>
             </a:r>
             <a:endParaRPr lang="en-US" dirty="0"/>
           </a:p>
@@ -1506,7 +1624,7 @@
           <a:p>
             <a:fld id="{FB3DB562-E846-4250-A215-238DB2E494A8}" type="datetimeFigureOut">
               <a:rPr lang="en-US" smtClean="0"/>
-              <a:t>5/1/2015</a:t>
+              <a:t>5/3/2015</a:t>
             </a:fld>
             <a:endParaRPr lang="en-US"/>
           </a:p>
@@ -1676,7 +1794,7 @@
           <a:p>
             <a:fld id="{FB3DB562-E846-4250-A215-238DB2E494A8}" type="datetimeFigureOut">
               <a:rPr lang="en-US" smtClean="0"/>
-              <a:t>5/1/2015</a:t>
+              <a:t>5/3/2015</a:t>
             </a:fld>
             <a:endParaRPr lang="en-US"/>
           </a:p>
@@ -1856,7 +1974,7 @@
           <a:p>
             <a:fld id="{FB3DB562-E846-4250-A215-238DB2E494A8}" type="datetimeFigureOut">
               <a:rPr lang="en-US" smtClean="0"/>
-              <a:t>5/1/2015</a:t>
+              <a:t>5/3/2015</a:t>
             </a:fld>
             <a:endParaRPr lang="en-US"/>
           </a:p>
@@ -2026,7 +2144,7 @@
           <a:p>
             <a:fld id="{FB3DB562-E846-4250-A215-238DB2E494A8}" type="datetimeFigureOut">
               <a:rPr lang="en-US" smtClean="0"/>
-              <a:t>5/1/2015</a:t>
+              <a:t>5/3/2015</a:t>
             </a:fld>
             <a:endParaRPr lang="en-US"/>
           </a:p>
@@ -2272,7 +2390,7 @@
           <a:p>
             <a:fld id="{FB3DB562-E846-4250-A215-238DB2E494A8}" type="datetimeFigureOut">
               <a:rPr lang="en-US" smtClean="0"/>
-              <a:t>5/1/2015</a:t>
+              <a:t>5/3/2015</a:t>
             </a:fld>
             <a:endParaRPr lang="en-US"/>
           </a:p>
@@ -2560,7 +2678,7 @@
           <a:p>
             <a:fld id="{FB3DB562-E846-4250-A215-238DB2E494A8}" type="datetimeFigureOut">
               <a:rPr lang="en-US" smtClean="0"/>
-              <a:t>5/1/2015</a:t>
+              <a:t>5/3/2015</a:t>
             </a:fld>
             <a:endParaRPr lang="en-US"/>
           </a:p>
@@ -2982,7 +3100,7 @@
           <a:p>
             <a:fld id="{FB3DB562-E846-4250-A215-238DB2E494A8}" type="datetimeFigureOut">
               <a:rPr lang="en-US" smtClean="0"/>
-              <a:t>5/1/2015</a:t>
+              <a:t>5/3/2015</a:t>
             </a:fld>
             <a:endParaRPr lang="en-US"/>
           </a:p>
@@ -3100,7 +3218,7 @@
           <a:p>
             <a:fld id="{FB3DB562-E846-4250-A215-238DB2E494A8}" type="datetimeFigureOut">
               <a:rPr lang="en-US" smtClean="0"/>
-              <a:t>5/1/2015</a:t>
+              <a:t>5/3/2015</a:t>
             </a:fld>
             <a:endParaRPr lang="en-US"/>
           </a:p>
@@ -3195,7 +3313,7 @@
           <a:p>
             <a:fld id="{FB3DB562-E846-4250-A215-238DB2E494A8}" type="datetimeFigureOut">
               <a:rPr lang="en-US" smtClean="0"/>
-              <a:t>5/1/2015</a:t>
+              <a:t>5/3/2015</a:t>
             </a:fld>
             <a:endParaRPr lang="en-US"/>
           </a:p>
@@ -3472,7 +3590,7 @@
           <a:p>
             <a:fld id="{FB3DB562-E846-4250-A215-238DB2E494A8}" type="datetimeFigureOut">
               <a:rPr lang="en-US" smtClean="0"/>
-              <a:t>5/1/2015</a:t>
+              <a:t>5/3/2015</a:t>
             </a:fld>
             <a:endParaRPr lang="en-US"/>
           </a:p>
@@ -3725,7 +3843,7 @@
           <a:p>
             <a:fld id="{FB3DB562-E846-4250-A215-238DB2E494A8}" type="datetimeFigureOut">
               <a:rPr lang="en-US" smtClean="0"/>
-              <a:t>5/1/2015</a:t>
+              <a:t>5/3/2015</a:t>
             </a:fld>
             <a:endParaRPr lang="en-US"/>
           </a:p>
@@ -3938,7 +4056,7 @@
           <a:p>
             <a:fld id="{FB3DB562-E846-4250-A215-238DB2E494A8}" type="datetimeFigureOut">
               <a:rPr lang="en-US" smtClean="0"/>
-              <a:t>5/1/2015</a:t>
+              <a:t>5/3/2015</a:t>
             </a:fld>
             <a:endParaRPr lang="en-US"/>
           </a:p>
@@ -4693,6 +4811,226 @@
 </p:sld>
 </file>
 
+<file path=ppt/slides/slide11.xml><?xml version="1.0" encoding="utf-8"?>
+<p:sld xmlns:a="http://schemas.openxmlformats.org/drawingml/2006/main" xmlns:r="http://schemas.openxmlformats.org/officeDocument/2006/relationships" xmlns:p="http://schemas.openxmlformats.org/presentationml/2006/main">
+  <p:cSld>
+    <p:spTree>
+      <p:nvGrpSpPr>
+        <p:cNvPr id="1" name=""/>
+        <p:cNvGrpSpPr/>
+        <p:nvPr/>
+      </p:nvGrpSpPr>
+      <p:grpSpPr>
+        <a:xfrm>
+          <a:off x="0" y="0"/>
+          <a:ext cx="0" cy="0"/>
+          <a:chOff x="0" y="0"/>
+          <a:chExt cx="0" cy="0"/>
+        </a:xfrm>
+      </p:grpSpPr>
+      <p:sp>
+        <p:nvSpPr>
+          <p:cNvPr id="2" name="Title 1"/>
+          <p:cNvSpPr>
+            <a:spLocks noGrp="1"/>
+          </p:cNvSpPr>
+          <p:nvPr>
+            <p:ph type="title"/>
+          </p:nvPr>
+        </p:nvSpPr>
+        <p:spPr/>
+        <p:txBody>
+          <a:bodyPr/>
+          <a:lstStyle/>
+          <a:p>
+            <a:r>
+              <a:rPr lang="en-US" dirty="0" smtClean="0"/>
+              <a:t>Software Development</a:t>
+            </a:r>
+            <a:endParaRPr lang="en-US" dirty="0"/>
+          </a:p>
+        </p:txBody>
+      </p:sp>
+      <p:sp>
+        <p:nvSpPr>
+          <p:cNvPr id="3" name="Content Placeholder 2"/>
+          <p:cNvSpPr>
+            <a:spLocks noGrp="1"/>
+          </p:cNvSpPr>
+          <p:nvPr>
+            <p:ph idx="1"/>
+          </p:nvPr>
+        </p:nvSpPr>
+        <p:spPr/>
+        <p:txBody>
+          <a:bodyPr/>
+          <a:lstStyle/>
+          <a:p>
+            <a:r>
+              <a:rPr lang="en-US" dirty="0" smtClean="0"/>
+              <a:t>Agile</a:t>
+            </a:r>
+          </a:p>
+          <a:p>
+            <a:pPr lvl="1"/>
+            <a:r>
+              <a:rPr lang="en-US" dirty="0" smtClean="0"/>
+              <a:t>Weekly iterations</a:t>
+            </a:r>
+          </a:p>
+          <a:p>
+            <a:pPr lvl="1"/>
+            <a:r>
+              <a:rPr lang="en-US" dirty="0" smtClean="0"/>
+              <a:t>Daily story / task assignments</a:t>
+            </a:r>
+          </a:p>
+          <a:p>
+            <a:r>
+              <a:rPr lang="en-US" dirty="0" smtClean="0"/>
+              <a:t>Scope – realistic </a:t>
+            </a:r>
+          </a:p>
+          <a:p>
+            <a:r>
+              <a:rPr lang="en-US" dirty="0" smtClean="0"/>
+              <a:t>Start small, make it work, expand on it</a:t>
+            </a:r>
+            <a:endParaRPr lang="en-US" dirty="0"/>
+          </a:p>
+        </p:txBody>
+      </p:sp>
+    </p:spTree>
+    <p:extLst>
+      <p:ext uri="{BB962C8B-B14F-4D97-AF65-F5344CB8AC3E}">
+        <p14:creationId xmlns:p14="http://schemas.microsoft.com/office/powerpoint/2010/main" val="1467065758"/>
+      </p:ext>
+    </p:extLst>
+  </p:cSld>
+  <p:clrMapOvr>
+    <a:masterClrMapping/>
+  </p:clrMapOvr>
+</p:sld>
+</file>
+
+<file path=ppt/slides/slide12.xml><?xml version="1.0" encoding="utf-8"?>
+<p:sld xmlns:a="http://schemas.openxmlformats.org/drawingml/2006/main" xmlns:r="http://schemas.openxmlformats.org/officeDocument/2006/relationships" xmlns:p="http://schemas.openxmlformats.org/presentationml/2006/main">
+  <p:cSld>
+    <p:spTree>
+      <p:nvGrpSpPr>
+        <p:cNvPr id="1" name=""/>
+        <p:cNvGrpSpPr/>
+        <p:nvPr/>
+      </p:nvGrpSpPr>
+      <p:grpSpPr>
+        <a:xfrm>
+          <a:off x="0" y="0"/>
+          <a:ext cx="0" cy="0"/>
+          <a:chOff x="0" y="0"/>
+          <a:chExt cx="0" cy="0"/>
+        </a:xfrm>
+      </p:grpSpPr>
+      <p:sp>
+        <p:nvSpPr>
+          <p:cNvPr id="2" name="Title 1"/>
+          <p:cNvSpPr>
+            <a:spLocks noGrp="1"/>
+          </p:cNvSpPr>
+          <p:nvPr>
+            <p:ph type="title"/>
+          </p:nvPr>
+        </p:nvSpPr>
+        <p:spPr/>
+        <p:txBody>
+          <a:bodyPr/>
+          <a:lstStyle/>
+          <a:p>
+            <a:r>
+              <a:rPr lang="en-US" dirty="0" smtClean="0"/>
+              <a:t>Scope</a:t>
+            </a:r>
+            <a:endParaRPr lang="en-US" dirty="0"/>
+          </a:p>
+        </p:txBody>
+      </p:sp>
+      <p:sp>
+        <p:nvSpPr>
+          <p:cNvPr id="3" name="Content Placeholder 2"/>
+          <p:cNvSpPr>
+            <a:spLocks noGrp="1"/>
+          </p:cNvSpPr>
+          <p:nvPr>
+            <p:ph idx="1"/>
+          </p:nvPr>
+        </p:nvSpPr>
+        <p:spPr/>
+        <p:txBody>
+          <a:bodyPr/>
+          <a:lstStyle/>
+          <a:p>
+            <a:r>
+              <a:rPr lang="en-US" dirty="0" smtClean="0"/>
+              <a:t>Out of Scope items</a:t>
+            </a:r>
+          </a:p>
+          <a:p>
+            <a:pPr lvl="1"/>
+            <a:r>
+              <a:rPr lang="en-US" dirty="0" smtClean="0"/>
+              <a:t>Security audit / refactoring</a:t>
+            </a:r>
+          </a:p>
+          <a:p>
+            <a:pPr lvl="1"/>
+            <a:r>
+              <a:rPr lang="en-US" dirty="0" smtClean="0"/>
+              <a:t>Refactor to add accessibility</a:t>
+            </a:r>
+          </a:p>
+          <a:p>
+            <a:pPr lvl="1"/>
+            <a:r>
+              <a:rPr lang="en-US" dirty="0" smtClean="0"/>
+              <a:t>Review fonts, CSS, for consistency page-to-page</a:t>
+            </a:r>
+          </a:p>
+          <a:p>
+            <a:pPr lvl="1"/>
+            <a:r>
+              <a:rPr lang="en-US" dirty="0" smtClean="0"/>
+              <a:t>More UI testing</a:t>
+            </a:r>
+          </a:p>
+          <a:p>
+            <a:pPr lvl="1"/>
+            <a:r>
+              <a:rPr lang="en-US" dirty="0" smtClean="0"/>
+              <a:t>More performance and scale testing</a:t>
+            </a:r>
+          </a:p>
+          <a:p>
+            <a:pPr lvl="1"/>
+            <a:endParaRPr lang="en-US" dirty="0" smtClean="0"/>
+          </a:p>
+          <a:p>
+            <a:pPr lvl="1"/>
+            <a:endParaRPr lang="en-US" dirty="0"/>
+          </a:p>
+        </p:txBody>
+      </p:sp>
+    </p:spTree>
+    <p:extLst>
+      <p:ext uri="{BB962C8B-B14F-4D97-AF65-F5344CB8AC3E}">
+        <p14:creationId xmlns:p14="http://schemas.microsoft.com/office/powerpoint/2010/main" val="1264694114"/>
+      </p:ext>
+    </p:extLst>
+  </p:cSld>
+  <p:clrMapOvr>
+    <a:masterClrMapping/>
+  </p:clrMapOvr>
+</p:sld>
+</file>
+
 <file path=ppt/slides/slide2.xml><?xml version="1.0" encoding="utf-8"?>
 <p:sld xmlns:a="http://schemas.openxmlformats.org/drawingml/2006/main" xmlns:r="http://schemas.openxmlformats.org/officeDocument/2006/relationships" xmlns:p="http://schemas.openxmlformats.org/presentationml/2006/main">
   <p:cSld>
@@ -4764,6 +5102,35 @@
           </a:extLst>
         </p:spPr>
       </p:pic>
+      <p:sp>
+        <p:nvSpPr>
+          <p:cNvPr id="2" name="Rectangle 1"/>
+          <p:cNvSpPr/>
+          <p:nvPr/>
+        </p:nvSpPr>
+        <p:spPr>
+          <a:xfrm>
+            <a:off x="1981200" y="152400"/>
+            <a:ext cx="4800600" cy="584775"/>
+          </a:xfrm>
+          <a:prstGeom prst="rect">
+            <a:avLst/>
+          </a:prstGeom>
+        </p:spPr>
+        <p:txBody>
+          <a:bodyPr wrap="square">
+            <a:spAutoFit/>
+          </a:bodyPr>
+          <a:lstStyle/>
+          <a:p>
+            <a:r>
+              <a:rPr lang="en-US" sz="3200" dirty="0" smtClean="0"/>
+              <a:t>Planning  a  Vacation </a:t>
+            </a:r>
+            <a:endParaRPr lang="en-US" sz="3200" dirty="0"/>
+          </a:p>
+        </p:txBody>
+      </p:sp>
     </p:spTree>
     <p:extLst>
       <p:ext uri="{BB962C8B-B14F-4D97-AF65-F5344CB8AC3E}">
@@ -4858,6 +5225,39 @@
           </a:extLst>
         </p:spPr>
       </p:pic>
+      <p:sp>
+        <p:nvSpPr>
+          <p:cNvPr id="2" name="Rectangle 1"/>
+          <p:cNvSpPr/>
+          <p:nvPr/>
+        </p:nvSpPr>
+        <p:spPr>
+          <a:xfrm>
+            <a:off x="1530350" y="152400"/>
+            <a:ext cx="6027804" cy="523220"/>
+          </a:xfrm>
+          <a:prstGeom prst="rect">
+            <a:avLst/>
+          </a:prstGeom>
+        </p:spPr>
+        <p:txBody>
+          <a:bodyPr wrap="none">
+            <a:spAutoFit/>
+          </a:bodyPr>
+          <a:lstStyle/>
+          <a:p>
+            <a:r>
+              <a:rPr lang="en-US" sz="2800" dirty="0" smtClean="0"/>
+              <a:t>Software Engineer Planning  </a:t>
+            </a:r>
+            <a:r>
+              <a:rPr lang="en-US" sz="2800" dirty="0"/>
+              <a:t>a  Vacation </a:t>
+            </a:r>
+            <a:endParaRPr lang="en-US" sz="2800" dirty="0"/>
+          </a:p>
+        </p:txBody>
+      </p:sp>
     </p:spTree>
     <p:extLst>
       <p:ext uri="{BB962C8B-B14F-4D97-AF65-F5344CB8AC3E}">
@@ -4900,12 +5300,14 @@
         </p:nvSpPr>
         <p:spPr>
           <a:xfrm>
-            <a:off x="685800" y="533401"/>
-            <a:ext cx="7772400" cy="1142999"/>
+            <a:off x="647700" y="381000"/>
+            <a:ext cx="7772400" cy="685799"/>
           </a:xfrm>
         </p:spPr>
         <p:txBody>
-          <a:bodyPr/>
+          <a:bodyPr>
+            <a:normAutofit fontScale="90000"/>
+          </a:bodyPr>
           <a:lstStyle/>
           <a:p>
             <a:r>
@@ -4928,13 +5330,13 @@
         </p:nvSpPr>
         <p:spPr>
           <a:xfrm>
-            <a:off x="685800" y="1752600"/>
-            <a:ext cx="7696200" cy="3886200"/>
+            <a:off x="685800" y="1676400"/>
+            <a:ext cx="7696200" cy="3962400"/>
           </a:xfrm>
         </p:spPr>
         <p:txBody>
           <a:bodyPr>
-            <a:normAutofit/>
+            <a:normAutofit fontScale="92500" lnSpcReduction="10000"/>
           </a:bodyPr>
           <a:lstStyle/>
           <a:p>
@@ -4944,8 +5346,23 @@
                   <a:schemeClr val="tx1"/>
                 </a:solidFill>
               </a:rPr>
-              <a:t>Problem Statement</a:t>
-            </a:r>
+              <a:t>Problem </a:t>
+            </a:r>
+            <a:r>
+              <a:rPr lang="en-US" b="1" dirty="0" smtClean="0">
+                <a:solidFill>
+                  <a:schemeClr val="tx1"/>
+                </a:solidFill>
+              </a:rPr>
+              <a:t>Statement</a:t>
+            </a:r>
+          </a:p>
+          <a:p>
+            <a:endParaRPr lang="en-US" b="1" dirty="0" smtClean="0">
+              <a:solidFill>
+                <a:schemeClr val="tx1"/>
+              </a:solidFill>
+            </a:endParaRPr>
           </a:p>
           <a:p>
             <a:pPr algn="l"/>
@@ -4974,7 +5391,34 @@
                   <a:schemeClr val="tx1"/>
                 </a:solidFill>
               </a:rPr>
-              <a:t>Where and how to store this?  Mike’s spreadsheet?  (better bring the laptop along)</a:t>
+              <a:t>Where and how to store </a:t>
+            </a:r>
+            <a:r>
+              <a:rPr lang="en-US" dirty="0" smtClean="0">
+                <a:solidFill>
+                  <a:schemeClr val="tx1"/>
+                </a:solidFill>
+              </a:rPr>
+              <a:t>this? </a:t>
+            </a:r>
+          </a:p>
+          <a:p>
+            <a:pPr algn="l"/>
+            <a:r>
+              <a:rPr lang="en-US" dirty="0" smtClean="0">
+                <a:solidFill>
+                  <a:schemeClr val="tx1"/>
+                </a:solidFill>
+              </a:rPr>
+              <a:t>Mike’s </a:t>
+            </a:r>
+            <a:r>
+              <a:rPr lang="en-US" dirty="0" smtClean="0">
+                <a:solidFill>
+                  <a:schemeClr val="tx1"/>
+                </a:solidFill>
+              </a:rPr>
+              <a:t>spreadsheet?  (better bring the laptop along)</a:t>
             </a:r>
           </a:p>
           <a:p>
@@ -5076,7 +5520,15 @@
                   <a:schemeClr val="tx1"/>
                 </a:solidFill>
               </a:rPr>
-              <a:t>Problem Statement</a:t>
+              <a:t>Solution </a:t>
+            </a:r>
+            <a:r>
+              <a:rPr lang="en-US" b="1" dirty="0" smtClean="0">
+                <a:solidFill>
+                  <a:schemeClr val="tx1"/>
+                </a:solidFill>
+              </a:rPr>
+              <a:t>Statement</a:t>
             </a:r>
           </a:p>
           <a:p>
@@ -5408,6 +5860,167 @@
               <a:rPr lang="en-US" dirty="0" smtClean="0"/>
               <a:t>DEMO</a:t>
             </a:r>
+            <a:endParaRPr lang="en-US" dirty="0"/>
+          </a:p>
+        </p:txBody>
+      </p:sp>
+      <p:sp>
+        <p:nvSpPr>
+          <p:cNvPr id="3" name="TextBox 2"/>
+          <p:cNvSpPr txBox="1"/>
+          <p:nvPr/>
+        </p:nvSpPr>
+        <p:spPr>
+          <a:xfrm>
+            <a:off x="762000" y="1600200"/>
+            <a:ext cx="6400800" cy="4247317"/>
+          </a:xfrm>
+          <a:prstGeom prst="rect">
+            <a:avLst/>
+          </a:prstGeom>
+          <a:noFill/>
+        </p:spPr>
+        <p:txBody>
+          <a:bodyPr wrap="square" rtlCol="0">
+            <a:spAutoFit/>
+          </a:bodyPr>
+          <a:lstStyle/>
+          <a:p>
+            <a:pPr marL="342900" indent="-342900">
+              <a:buFont typeface="+mj-lt"/>
+              <a:buAutoNum type="arabicPeriod"/>
+            </a:pPr>
+            <a:r>
+              <a:rPr lang="en-US" dirty="0" smtClean="0"/>
+              <a:t>Register</a:t>
+            </a:r>
+          </a:p>
+          <a:p>
+            <a:pPr marL="342900" indent="-342900">
+              <a:buFont typeface="+mj-lt"/>
+              <a:buAutoNum type="arabicPeriod"/>
+            </a:pPr>
+            <a:r>
+              <a:rPr lang="en-US" dirty="0" smtClean="0"/>
+              <a:t>Create a vacation</a:t>
+            </a:r>
+          </a:p>
+          <a:p>
+            <a:pPr marL="342900" indent="-342900">
+              <a:buFont typeface="+mj-lt"/>
+              <a:buAutoNum type="arabicPeriod"/>
+            </a:pPr>
+            <a:r>
+              <a:rPr lang="en-US" dirty="0" smtClean="0"/>
+              <a:t>Add first row</a:t>
+            </a:r>
+          </a:p>
+          <a:p>
+            <a:pPr marL="800100" lvl="1" indent="-342900">
+              <a:buFont typeface="+mj-lt"/>
+              <a:buAutoNum type="arabicPeriod"/>
+            </a:pPr>
+            <a:r>
+              <a:rPr lang="en-US" dirty="0" smtClean="0"/>
+              <a:t>Enter some data</a:t>
+            </a:r>
+          </a:p>
+          <a:p>
+            <a:pPr marL="342900" indent="-342900">
+              <a:buFont typeface="+mj-lt"/>
+              <a:buAutoNum type="arabicPeriod"/>
+            </a:pPr>
+            <a:r>
+              <a:rPr lang="en-US" dirty="0" smtClean="0"/>
+              <a:t>Add second row</a:t>
+            </a:r>
+          </a:p>
+          <a:p>
+            <a:pPr marL="800100" lvl="1" indent="-342900">
+              <a:buFont typeface="+mj-lt"/>
+              <a:buAutoNum type="arabicPeriod"/>
+            </a:pPr>
+            <a:r>
+              <a:rPr lang="en-US" dirty="0" smtClean="0"/>
+              <a:t>Enter some data</a:t>
+            </a:r>
+          </a:p>
+          <a:p>
+            <a:pPr marL="342900" indent="-342900">
+              <a:buFont typeface="+mj-lt"/>
+              <a:buAutoNum type="arabicPeriod"/>
+            </a:pPr>
+            <a:r>
+              <a:rPr lang="en-US" dirty="0" smtClean="0"/>
+              <a:t>Enter third row ( and provide some feed back on the UI)</a:t>
+            </a:r>
+          </a:p>
+          <a:p>
+            <a:pPr marL="800100" lvl="1" indent="-342900">
+              <a:buFont typeface="+mj-lt"/>
+              <a:buAutoNum type="arabicPeriod"/>
+            </a:pPr>
+            <a:r>
+              <a:rPr lang="en-US" dirty="0" smtClean="0"/>
+              <a:t>in morning activity – enter a positive comment</a:t>
+            </a:r>
+          </a:p>
+          <a:p>
+            <a:pPr marL="800100" lvl="1" indent="-342900">
+              <a:buFont typeface="+mj-lt"/>
+              <a:buAutoNum type="arabicPeriod"/>
+            </a:pPr>
+            <a:r>
+              <a:rPr lang="en-US" dirty="0" smtClean="0"/>
+              <a:t>In afternoon activity – enter a negative comment</a:t>
+            </a:r>
+          </a:p>
+          <a:p>
+            <a:pPr marL="800100" lvl="1" indent="-342900">
+              <a:buFont typeface="+mj-lt"/>
+              <a:buAutoNum type="arabicPeriod"/>
+            </a:pPr>
+            <a:r>
+              <a:rPr lang="en-US" dirty="0" smtClean="0"/>
+              <a:t>In evening activity – enter a suggestion</a:t>
+            </a:r>
+          </a:p>
+          <a:p>
+            <a:pPr marL="800100" lvl="1" indent="-342900">
+              <a:buFont typeface="+mj-lt"/>
+              <a:buAutoNum type="arabicPeriod"/>
+            </a:pPr>
+            <a:r>
+              <a:rPr lang="en-US" dirty="0" smtClean="0"/>
+              <a:t>SAVE</a:t>
+            </a:r>
+          </a:p>
+          <a:p>
+            <a:pPr marL="800100" lvl="1" indent="-342900">
+              <a:buFont typeface="+mj-lt"/>
+              <a:buAutoNum type="arabicPeriod"/>
+            </a:pPr>
+            <a:endParaRPr lang="en-US" dirty="0" smtClean="0"/>
+          </a:p>
+          <a:p>
+            <a:pPr marL="342900" indent="-342900">
+              <a:buFont typeface="+mj-lt"/>
+              <a:buAutoNum type="arabicPeriod"/>
+            </a:pPr>
+            <a:endParaRPr lang="en-US" dirty="0"/>
+          </a:p>
+          <a:p>
+            <a:pPr marL="342900" indent="-342900">
+              <a:buFont typeface="+mj-lt"/>
+              <a:buAutoNum type="arabicPeriod"/>
+            </a:pPr>
+            <a:endParaRPr lang="en-US" dirty="0" smtClean="0"/>
+          </a:p>
+          <a:p>
+            <a:pPr marL="342900" indent="-342900">
+              <a:buFont typeface="+mj-lt"/>
+              <a:buAutoNum type="arabicPeriod"/>
+            </a:pPr>
             <a:endParaRPr lang="en-US" dirty="0"/>
           </a:p>
         </p:txBody>

</xml_diff>